<commit_message>
Update the Class2_szu PPT
</commit_message>
<xml_diff>
--- a/Class2_szu_151027.pptx
+++ b/Class2_szu_151027.pptx
@@ -5,10 +5,10 @@
     <p:sldMasterId id="2147483746" r:id="rId1"/>
   </p:sldMasterIdLst>
   <p:notesMasterIdLst>
-    <p:notesMasterId r:id="rId37"/>
+    <p:notesMasterId r:id="rId38"/>
   </p:notesMasterIdLst>
   <p:handoutMasterIdLst>
-    <p:handoutMasterId r:id="rId38"/>
+    <p:handoutMasterId r:id="rId39"/>
   </p:handoutMasterIdLst>
   <p:sldIdLst>
     <p:sldId id="256" r:id="rId2"/>
@@ -46,6 +46,7 @@
     <p:sldId id="288" r:id="rId34"/>
     <p:sldId id="289" r:id="rId35"/>
     <p:sldId id="290" r:id="rId36"/>
+    <p:sldId id="291" r:id="rId37"/>
   </p:sldIdLst>
   <p:sldSz cx="9144000" cy="6858000" type="screen4x3"/>
   <p:notesSz cx="6858000" cy="9144000"/>
@@ -278,7 +279,7 @@
           <a:p>
             <a:fld id="{4F259F21-D001-4BAF-9D49-EB7BB12405E8}" type="datetimeFigureOut">
               <a:rPr lang="zh-CN" altLang="en-US" smtClean="0"/>
-              <a:t>2015/10/27</a:t>
+              <a:t>2015/10/28</a:t>
             </a:fld>
             <a:endParaRPr lang="zh-CN" altLang="en-US"/>
           </a:p>
@@ -470,7 +471,7 @@
               <a:pPr>
                 <a:defRPr/>
               </a:pPr>
-              <a:t>2015/10/27</a:t>
+              <a:t>2015/10/28</a:t>
             </a:fld>
             <a:endParaRPr lang="zh-CN" altLang="en-US"/>
           </a:p>
@@ -4107,11 +4108,7 @@
             </a:pPr>
             <a:r>
               <a:rPr lang="zh-CN" altLang="en-US" dirty="0" smtClean="0"/>
-              <a:t>第二次</a:t>
-            </a:r>
-            <a:r>
-              <a:rPr lang="zh-CN" altLang="en-US" dirty="0" smtClean="0"/>
-              <a:t>习题课</a:t>
+              <a:t>第二次习题课</a:t>
             </a:r>
             <a:endParaRPr lang="zh-CN" altLang="en-US" dirty="0"/>
           </a:p>
@@ -6615,11 +6612,7 @@
               </a:lnSpc>
             </a:pPr>
             <a:r>
-              <a:rPr lang="en-US" altLang="zh-CN" dirty="0" smtClean="0"/>
-              <a:t>   </a:t>
-            </a:r>
-            <a:r>
-              <a:rPr lang="zh-CN" altLang="en-US" sz="3200" dirty="0">
+              <a:rPr lang="zh-CN" altLang="en-US" sz="3200" dirty="0" smtClean="0">
                 <a:solidFill>
                   <a:schemeClr val="bg1"/>
                 </a:solidFill>
@@ -6685,11 +6678,7 @@
             <a:pPr algn="l"/>
             <a:r>
               <a:rPr lang="zh-CN" altLang="en-US" b="1" dirty="0" smtClean="0"/>
-              <a:t>        助教</a:t>
-            </a:r>
-            <a:r>
-              <a:rPr lang="zh-CN" altLang="en-US" b="1" dirty="0" smtClean="0"/>
-              <a:t>：直博生 祖松鹏</a:t>
+              <a:t>        助教：直博生 祖松鹏</a:t>
             </a:r>
             <a:r>
               <a:rPr lang="en-US" altLang="zh-CN" b="1" dirty="0" smtClean="0"/>
@@ -6697,11 +6686,7 @@
             </a:r>
             <a:r>
               <a:rPr lang="zh-CN" altLang="en-US" b="1" dirty="0" smtClean="0"/>
-              <a:t>张</a:t>
-            </a:r>
-            <a:r>
-              <a:rPr lang="zh-CN" altLang="en-US" b="1" dirty="0" smtClean="0"/>
-              <a:t>鹏</a:t>
+              <a:t>张鹏</a:t>
             </a:r>
             <a:r>
               <a:rPr lang="en-US" altLang="zh-CN" b="1" dirty="0" smtClean="0"/>
@@ -6712,11 +6697,7 @@
             <a:pPr algn="l"/>
             <a:r>
               <a:rPr lang="zh-CN" altLang="en-US" b="1" dirty="0" smtClean="0"/>
-              <a:t>        日期</a:t>
-            </a:r>
-            <a:r>
-              <a:rPr lang="zh-CN" altLang="en-US" b="1" dirty="0" smtClean="0"/>
-              <a:t>：</a:t>
+              <a:t>        日期：</a:t>
             </a:r>
             <a:r>
               <a:rPr lang="en-US" altLang="zh-CN" b="1" dirty="0" smtClean="0"/>
@@ -9096,7 +9077,7 @@
           <a:graphicData uri="http://schemas.openxmlformats.org/presentationml/2006/ole">
             <mc:AlternateContent xmlns:mc="http://schemas.openxmlformats.org/markup-compatibility/2006">
               <mc:Choice xmlns:v="urn:schemas-microsoft-com:vml" Requires="v">
-                <p:oleObj spid="_x0000_s7173" name="Equation" r:id="rId4" imgW="8216900" imgH="914400" progId="Equation.3">
+                <p:oleObj spid="_x0000_s7188" name="Equation" r:id="rId4" imgW="8216900" imgH="914400" progId="Equation.3">
                   <p:embed/>
                 </p:oleObj>
               </mc:Choice>
@@ -28771,11 +28752,7 @@
             </a:r>
             <a:r>
               <a:rPr lang="zh-CN" altLang="en-US" dirty="0" smtClean="0"/>
-              <a:t>次</a:t>
-            </a:r>
-            <a:r>
-              <a:rPr lang="zh-CN" altLang="en-US" dirty="0" smtClean="0"/>
-              <a:t>习题课</a:t>
+              <a:t>次习题课</a:t>
             </a:r>
             <a:endParaRPr lang="zh-CN" altLang="en-US" dirty="0"/>
           </a:p>
@@ -31694,9 +31671,582 @@
   <p:timing>
     <p:tnLst>
       <p:par>
-        <p:cTn id="1" dur="indefinite" restart="never" nodeType="tmRoot"/>
+        <p:cTn id="1" dur="indefinite" restart="never" nodeType="tmRoot">
+          <p:childTnLst>
+            <p:seq concurrent="1" nextAc="seek">
+              <p:cTn id="2" dur="indefinite" nodeType="mainSeq">
+                <p:childTnLst>
+                  <p:par>
+                    <p:cTn id="3" fill="hold">
+                      <p:stCondLst>
+                        <p:cond delay="indefinite"/>
+                      </p:stCondLst>
+                      <p:childTnLst>
+                        <p:par>
+                          <p:cTn id="4" fill="hold">
+                            <p:stCondLst>
+                              <p:cond delay="0"/>
+                            </p:stCondLst>
+                            <p:childTnLst>
+                              <p:par>
+                                <p:cTn id="5" presetID="1" presetClass="entr" presetSubtype="0" fill="hold" grpId="0" nodeType="clickEffect">
+                                  <p:stCondLst>
+                                    <p:cond delay="0"/>
+                                  </p:stCondLst>
+                                  <p:childTnLst>
+                                    <p:set>
+                                      <p:cBhvr>
+                                        <p:cTn id="6" dur="1" fill="hold">
+                                          <p:stCondLst>
+                                            <p:cond delay="0"/>
+                                          </p:stCondLst>
+                                        </p:cTn>
+                                        <p:tgtEl>
+                                          <p:spTgt spid="3">
+                                            <p:txEl>
+                                              <p:pRg st="0" end="0"/>
+                                            </p:txEl>
+                                          </p:spTgt>
+                                        </p:tgtEl>
+                                        <p:attrNameLst>
+                                          <p:attrName>style.visibility</p:attrName>
+                                        </p:attrNameLst>
+                                      </p:cBhvr>
+                                      <p:to>
+                                        <p:strVal val="visible"/>
+                                      </p:to>
+                                    </p:set>
+                                  </p:childTnLst>
+                                </p:cTn>
+                              </p:par>
+                              <p:par>
+                                <p:cTn id="7" presetID="1" presetClass="entr" presetSubtype="0" fill="hold" grpId="0" nodeType="withEffect">
+                                  <p:stCondLst>
+                                    <p:cond delay="0"/>
+                                  </p:stCondLst>
+                                  <p:childTnLst>
+                                    <p:set>
+                                      <p:cBhvr>
+                                        <p:cTn id="8" dur="1" fill="hold">
+                                          <p:stCondLst>
+                                            <p:cond delay="0"/>
+                                          </p:stCondLst>
+                                        </p:cTn>
+                                        <p:tgtEl>
+                                          <p:spTgt spid="3">
+                                            <p:txEl>
+                                              <p:pRg st="1" end="1"/>
+                                            </p:txEl>
+                                          </p:spTgt>
+                                        </p:tgtEl>
+                                        <p:attrNameLst>
+                                          <p:attrName>style.visibility</p:attrName>
+                                        </p:attrNameLst>
+                                      </p:cBhvr>
+                                      <p:to>
+                                        <p:strVal val="visible"/>
+                                      </p:to>
+                                    </p:set>
+                                  </p:childTnLst>
+                                </p:cTn>
+                              </p:par>
+                            </p:childTnLst>
+                          </p:cTn>
+                        </p:par>
+                      </p:childTnLst>
+                    </p:cTn>
+                  </p:par>
+                  <p:par>
+                    <p:cTn id="9" fill="hold">
+                      <p:stCondLst>
+                        <p:cond delay="indefinite"/>
+                      </p:stCondLst>
+                      <p:childTnLst>
+                        <p:par>
+                          <p:cTn id="10" fill="hold">
+                            <p:stCondLst>
+                              <p:cond delay="0"/>
+                            </p:stCondLst>
+                            <p:childTnLst>
+                              <p:par>
+                                <p:cTn id="11" presetID="1" presetClass="entr" presetSubtype="0" fill="hold" nodeType="clickEffect">
+                                  <p:stCondLst>
+                                    <p:cond delay="0"/>
+                                  </p:stCondLst>
+                                  <p:childTnLst>
+                                    <p:set>
+                                      <p:cBhvr>
+                                        <p:cTn id="12" dur="1" fill="hold">
+                                          <p:stCondLst>
+                                            <p:cond delay="0"/>
+                                          </p:stCondLst>
+                                        </p:cTn>
+                                        <p:tgtEl>
+                                          <p:spTgt spid="9"/>
+                                        </p:tgtEl>
+                                        <p:attrNameLst>
+                                          <p:attrName>style.visibility</p:attrName>
+                                        </p:attrNameLst>
+                                      </p:cBhvr>
+                                      <p:to>
+                                        <p:strVal val="visible"/>
+                                      </p:to>
+                                    </p:set>
+                                  </p:childTnLst>
+                                </p:cTn>
+                              </p:par>
+                              <p:par>
+                                <p:cTn id="13" presetID="1" presetClass="entr" presetSubtype="0" fill="hold" nodeType="withEffect">
+                                  <p:stCondLst>
+                                    <p:cond delay="0"/>
+                                  </p:stCondLst>
+                                  <p:childTnLst>
+                                    <p:set>
+                                      <p:cBhvr>
+                                        <p:cTn id="14" dur="1" fill="hold">
+                                          <p:stCondLst>
+                                            <p:cond delay="0"/>
+                                          </p:stCondLst>
+                                        </p:cTn>
+                                        <p:tgtEl>
+                                          <p:spTgt spid="8"/>
+                                        </p:tgtEl>
+                                        <p:attrNameLst>
+                                          <p:attrName>style.visibility</p:attrName>
+                                        </p:attrNameLst>
+                                      </p:cBhvr>
+                                      <p:to>
+                                        <p:strVal val="visible"/>
+                                      </p:to>
+                                    </p:set>
+                                  </p:childTnLst>
+                                </p:cTn>
+                              </p:par>
+                            </p:childTnLst>
+                          </p:cTn>
+                        </p:par>
+                      </p:childTnLst>
+                    </p:cTn>
+                  </p:par>
+                  <p:par>
+                    <p:cTn id="15" fill="hold">
+                      <p:stCondLst>
+                        <p:cond delay="indefinite"/>
+                      </p:stCondLst>
+                      <p:childTnLst>
+                        <p:par>
+                          <p:cTn id="16" fill="hold">
+                            <p:stCondLst>
+                              <p:cond delay="0"/>
+                            </p:stCondLst>
+                            <p:childTnLst>
+                              <p:par>
+                                <p:cTn id="17" presetID="1" presetClass="entr" presetSubtype="0" fill="hold" grpId="0" nodeType="clickEffect">
+                                  <p:stCondLst>
+                                    <p:cond delay="0"/>
+                                  </p:stCondLst>
+                                  <p:childTnLst>
+                                    <p:set>
+                                      <p:cBhvr>
+                                        <p:cTn id="18" dur="1" fill="hold">
+                                          <p:stCondLst>
+                                            <p:cond delay="0"/>
+                                          </p:stCondLst>
+                                        </p:cTn>
+                                        <p:tgtEl>
+                                          <p:spTgt spid="3">
+                                            <p:txEl>
+                                              <p:pRg st="2" end="2"/>
+                                            </p:txEl>
+                                          </p:spTgt>
+                                        </p:tgtEl>
+                                        <p:attrNameLst>
+                                          <p:attrName>style.visibility</p:attrName>
+                                        </p:attrNameLst>
+                                      </p:cBhvr>
+                                      <p:to>
+                                        <p:strVal val="visible"/>
+                                      </p:to>
+                                    </p:set>
+                                  </p:childTnLst>
+                                </p:cTn>
+                              </p:par>
+                              <p:par>
+                                <p:cTn id="19" presetID="1" presetClass="entr" presetSubtype="0" fill="hold" grpId="0" nodeType="withEffect">
+                                  <p:stCondLst>
+                                    <p:cond delay="0"/>
+                                  </p:stCondLst>
+                                  <p:childTnLst>
+                                    <p:set>
+                                      <p:cBhvr>
+                                        <p:cTn id="20" dur="1" fill="hold">
+                                          <p:stCondLst>
+                                            <p:cond delay="0"/>
+                                          </p:stCondLst>
+                                        </p:cTn>
+                                        <p:tgtEl>
+                                          <p:spTgt spid="3">
+                                            <p:txEl>
+                                              <p:pRg st="3" end="3"/>
+                                            </p:txEl>
+                                          </p:spTgt>
+                                        </p:tgtEl>
+                                        <p:attrNameLst>
+                                          <p:attrName>style.visibility</p:attrName>
+                                        </p:attrNameLst>
+                                      </p:cBhvr>
+                                      <p:to>
+                                        <p:strVal val="visible"/>
+                                      </p:to>
+                                    </p:set>
+                                  </p:childTnLst>
+                                </p:cTn>
+                              </p:par>
+                              <p:par>
+                                <p:cTn id="21" presetID="1" presetClass="entr" presetSubtype="0" fill="hold" grpId="0" nodeType="withEffect">
+                                  <p:stCondLst>
+                                    <p:cond delay="0"/>
+                                  </p:stCondLst>
+                                  <p:childTnLst>
+                                    <p:set>
+                                      <p:cBhvr>
+                                        <p:cTn id="22" dur="1" fill="hold">
+                                          <p:stCondLst>
+                                            <p:cond delay="0"/>
+                                          </p:stCondLst>
+                                        </p:cTn>
+                                        <p:tgtEl>
+                                          <p:spTgt spid="3">
+                                            <p:txEl>
+                                              <p:pRg st="4" end="4"/>
+                                            </p:txEl>
+                                          </p:spTgt>
+                                        </p:tgtEl>
+                                        <p:attrNameLst>
+                                          <p:attrName>style.visibility</p:attrName>
+                                        </p:attrNameLst>
+                                      </p:cBhvr>
+                                      <p:to>
+                                        <p:strVal val="visible"/>
+                                      </p:to>
+                                    </p:set>
+                                  </p:childTnLst>
+                                </p:cTn>
+                              </p:par>
+                            </p:childTnLst>
+                          </p:cTn>
+                        </p:par>
+                      </p:childTnLst>
+                    </p:cTn>
+                  </p:par>
+                  <p:par>
+                    <p:cTn id="23" fill="hold">
+                      <p:stCondLst>
+                        <p:cond delay="indefinite"/>
+                      </p:stCondLst>
+                      <p:childTnLst>
+                        <p:par>
+                          <p:cTn id="24" fill="hold">
+                            <p:stCondLst>
+                              <p:cond delay="0"/>
+                            </p:stCondLst>
+                            <p:childTnLst>
+                              <p:par>
+                                <p:cTn id="25" presetID="1" presetClass="entr" presetSubtype="0" fill="hold" grpId="0" nodeType="clickEffect">
+                                  <p:stCondLst>
+                                    <p:cond delay="0"/>
+                                  </p:stCondLst>
+                                  <p:childTnLst>
+                                    <p:set>
+                                      <p:cBhvr>
+                                        <p:cTn id="26" dur="1" fill="hold">
+                                          <p:stCondLst>
+                                            <p:cond delay="0"/>
+                                          </p:stCondLst>
+                                        </p:cTn>
+                                        <p:tgtEl>
+                                          <p:spTgt spid="3">
+                                            <p:txEl>
+                                              <p:pRg st="5" end="5"/>
+                                            </p:txEl>
+                                          </p:spTgt>
+                                        </p:tgtEl>
+                                        <p:attrNameLst>
+                                          <p:attrName>style.visibility</p:attrName>
+                                        </p:attrNameLst>
+                                      </p:cBhvr>
+                                      <p:to>
+                                        <p:strVal val="visible"/>
+                                      </p:to>
+                                    </p:set>
+                                  </p:childTnLst>
+                                </p:cTn>
+                              </p:par>
+                              <p:par>
+                                <p:cTn id="27" presetID="1" presetClass="entr" presetSubtype="0" fill="hold" grpId="0" nodeType="withEffect">
+                                  <p:stCondLst>
+                                    <p:cond delay="0"/>
+                                  </p:stCondLst>
+                                  <p:childTnLst>
+                                    <p:set>
+                                      <p:cBhvr>
+                                        <p:cTn id="28" dur="1" fill="hold">
+                                          <p:stCondLst>
+                                            <p:cond delay="0"/>
+                                          </p:stCondLst>
+                                        </p:cTn>
+                                        <p:tgtEl>
+                                          <p:spTgt spid="3">
+                                            <p:txEl>
+                                              <p:pRg st="6" end="6"/>
+                                            </p:txEl>
+                                          </p:spTgt>
+                                        </p:tgtEl>
+                                        <p:attrNameLst>
+                                          <p:attrName>style.visibility</p:attrName>
+                                        </p:attrNameLst>
+                                      </p:cBhvr>
+                                      <p:to>
+                                        <p:strVal val="visible"/>
+                                      </p:to>
+                                    </p:set>
+                                  </p:childTnLst>
+                                </p:cTn>
+                              </p:par>
+                              <p:par>
+                                <p:cTn id="29" presetID="1" presetClass="entr" presetSubtype="0" fill="hold" grpId="0" nodeType="withEffect">
+                                  <p:stCondLst>
+                                    <p:cond delay="0"/>
+                                  </p:stCondLst>
+                                  <p:childTnLst>
+                                    <p:set>
+                                      <p:cBhvr>
+                                        <p:cTn id="30" dur="1" fill="hold">
+                                          <p:stCondLst>
+                                            <p:cond delay="0"/>
+                                          </p:stCondLst>
+                                        </p:cTn>
+                                        <p:tgtEl>
+                                          <p:spTgt spid="3">
+                                            <p:txEl>
+                                              <p:pRg st="7" end="7"/>
+                                            </p:txEl>
+                                          </p:spTgt>
+                                        </p:tgtEl>
+                                        <p:attrNameLst>
+                                          <p:attrName>style.visibility</p:attrName>
+                                        </p:attrNameLst>
+                                      </p:cBhvr>
+                                      <p:to>
+                                        <p:strVal val="visible"/>
+                                      </p:to>
+                                    </p:set>
+                                  </p:childTnLst>
+                                </p:cTn>
+                              </p:par>
+                              <p:par>
+                                <p:cTn id="31" presetID="1" presetClass="entr" presetSubtype="0" fill="hold" grpId="0" nodeType="withEffect">
+                                  <p:stCondLst>
+                                    <p:cond delay="0"/>
+                                  </p:stCondLst>
+                                  <p:childTnLst>
+                                    <p:set>
+                                      <p:cBhvr>
+                                        <p:cTn id="32" dur="1" fill="hold">
+                                          <p:stCondLst>
+                                            <p:cond delay="0"/>
+                                          </p:stCondLst>
+                                        </p:cTn>
+                                        <p:tgtEl>
+                                          <p:spTgt spid="3">
+                                            <p:txEl>
+                                              <p:pRg st="8" end="8"/>
+                                            </p:txEl>
+                                          </p:spTgt>
+                                        </p:tgtEl>
+                                        <p:attrNameLst>
+                                          <p:attrName>style.visibility</p:attrName>
+                                        </p:attrNameLst>
+                                      </p:cBhvr>
+                                      <p:to>
+                                        <p:strVal val="visible"/>
+                                      </p:to>
+                                    </p:set>
+                                  </p:childTnLst>
+                                </p:cTn>
+                              </p:par>
+                              <p:par>
+                                <p:cTn id="33" presetID="1" presetClass="entr" presetSubtype="0" fill="hold" grpId="0" nodeType="withEffect">
+                                  <p:stCondLst>
+                                    <p:cond delay="0"/>
+                                  </p:stCondLst>
+                                  <p:childTnLst>
+                                    <p:set>
+                                      <p:cBhvr>
+                                        <p:cTn id="34" dur="1" fill="hold">
+                                          <p:stCondLst>
+                                            <p:cond delay="0"/>
+                                          </p:stCondLst>
+                                        </p:cTn>
+                                        <p:tgtEl>
+                                          <p:spTgt spid="3">
+                                            <p:txEl>
+                                              <p:pRg st="9" end="9"/>
+                                            </p:txEl>
+                                          </p:spTgt>
+                                        </p:tgtEl>
+                                        <p:attrNameLst>
+                                          <p:attrName>style.visibility</p:attrName>
+                                        </p:attrNameLst>
+                                      </p:cBhvr>
+                                      <p:to>
+                                        <p:strVal val="visible"/>
+                                      </p:to>
+                                    </p:set>
+                                  </p:childTnLst>
+                                </p:cTn>
+                              </p:par>
+                              <p:par>
+                                <p:cTn id="35" presetID="1" presetClass="entr" presetSubtype="0" fill="hold" grpId="0" nodeType="withEffect">
+                                  <p:stCondLst>
+                                    <p:cond delay="0"/>
+                                  </p:stCondLst>
+                                  <p:childTnLst>
+                                    <p:set>
+                                      <p:cBhvr>
+                                        <p:cTn id="36" dur="1" fill="hold">
+                                          <p:stCondLst>
+                                            <p:cond delay="0"/>
+                                          </p:stCondLst>
+                                        </p:cTn>
+                                        <p:tgtEl>
+                                          <p:spTgt spid="3">
+                                            <p:txEl>
+                                              <p:pRg st="10" end="10"/>
+                                            </p:txEl>
+                                          </p:spTgt>
+                                        </p:tgtEl>
+                                        <p:attrNameLst>
+                                          <p:attrName>style.visibility</p:attrName>
+                                        </p:attrNameLst>
+                                      </p:cBhvr>
+                                      <p:to>
+                                        <p:strVal val="visible"/>
+                                      </p:to>
+                                    </p:set>
+                                  </p:childTnLst>
+                                </p:cTn>
+                              </p:par>
+                              <p:par>
+                                <p:cTn id="37" presetID="1" presetClass="entr" presetSubtype="0" fill="hold" grpId="0" nodeType="withEffect">
+                                  <p:stCondLst>
+                                    <p:cond delay="0"/>
+                                  </p:stCondLst>
+                                  <p:childTnLst>
+                                    <p:set>
+                                      <p:cBhvr>
+                                        <p:cTn id="38" dur="1" fill="hold">
+                                          <p:stCondLst>
+                                            <p:cond delay="0"/>
+                                          </p:stCondLst>
+                                        </p:cTn>
+                                        <p:tgtEl>
+                                          <p:spTgt spid="3">
+                                            <p:txEl>
+                                              <p:pRg st="11" end="11"/>
+                                            </p:txEl>
+                                          </p:spTgt>
+                                        </p:tgtEl>
+                                        <p:attrNameLst>
+                                          <p:attrName>style.visibility</p:attrName>
+                                        </p:attrNameLst>
+                                      </p:cBhvr>
+                                      <p:to>
+                                        <p:strVal val="visible"/>
+                                      </p:to>
+                                    </p:set>
+                                  </p:childTnLst>
+                                </p:cTn>
+                              </p:par>
+                            </p:childTnLst>
+                          </p:cTn>
+                        </p:par>
+                      </p:childTnLst>
+                    </p:cTn>
+                  </p:par>
+                  <p:par>
+                    <p:cTn id="39" fill="hold">
+                      <p:stCondLst>
+                        <p:cond delay="indefinite"/>
+                      </p:stCondLst>
+                      <p:childTnLst>
+                        <p:par>
+                          <p:cTn id="40" fill="hold">
+                            <p:stCondLst>
+                              <p:cond delay="0"/>
+                            </p:stCondLst>
+                            <p:childTnLst>
+                              <p:par>
+                                <p:cTn id="41" presetID="1" presetClass="entr" presetSubtype="0" fill="hold" grpId="0" nodeType="clickEffect">
+                                  <p:stCondLst>
+                                    <p:cond delay="0"/>
+                                  </p:stCondLst>
+                                  <p:childTnLst>
+                                    <p:set>
+                                      <p:cBhvr>
+                                        <p:cTn id="42" dur="1" fill="hold">
+                                          <p:stCondLst>
+                                            <p:cond delay="0"/>
+                                          </p:stCondLst>
+                                        </p:cTn>
+                                        <p:tgtEl>
+                                          <p:spTgt spid="3">
+                                            <p:txEl>
+                                              <p:pRg st="12" end="12"/>
+                                            </p:txEl>
+                                          </p:spTgt>
+                                        </p:tgtEl>
+                                        <p:attrNameLst>
+                                          <p:attrName>style.visibility</p:attrName>
+                                        </p:attrNameLst>
+                                      </p:cBhvr>
+                                      <p:to>
+                                        <p:strVal val="visible"/>
+                                      </p:to>
+                                    </p:set>
+                                  </p:childTnLst>
+                                </p:cTn>
+                              </p:par>
+                            </p:childTnLst>
+                          </p:cTn>
+                        </p:par>
+                      </p:childTnLst>
+                    </p:cTn>
+                  </p:par>
+                </p:childTnLst>
+              </p:cTn>
+              <p:prevCondLst>
+                <p:cond evt="onPrev" delay="0">
+                  <p:tgtEl>
+                    <p:sldTgt/>
+                  </p:tgtEl>
+                </p:cond>
+              </p:prevCondLst>
+              <p:nextCondLst>
+                <p:cond evt="onNext" delay="0">
+                  <p:tgtEl>
+                    <p:sldTgt/>
+                  </p:tgtEl>
+                </p:cond>
+              </p:nextCondLst>
+            </p:seq>
+          </p:childTnLst>
+        </p:cTn>
       </p:par>
     </p:tnLst>
+    <p:bldLst>
+      <p:bldP spid="3" grpId="0" uiExpand="1" build="p"/>
+    </p:bldLst>
   </p:timing>
 </p:sld>
 </file>
@@ -32955,6 +33505,202 @@
   <p:clrMapOvr>
     <a:masterClrMapping/>
   </p:clrMapOvr>
+  <p:timing>
+    <p:tnLst>
+      <p:par>
+        <p:cTn id="1" dur="indefinite" restart="never" nodeType="tmRoot"/>
+      </p:par>
+    </p:tnLst>
+  </p:timing>
+</p:sld>
+</file>
+
+<file path=ppt/slides/slide36.xml><?xml version="1.0" encoding="utf-8"?>
+<p:sld xmlns:a="http://schemas.openxmlformats.org/drawingml/2006/main" xmlns:r="http://schemas.openxmlformats.org/officeDocument/2006/relationships" xmlns:p="http://schemas.openxmlformats.org/presentationml/2006/main">
+  <p:cSld>
+    <p:spTree>
+      <p:nvGrpSpPr>
+        <p:cNvPr id="1" name=""/>
+        <p:cNvGrpSpPr/>
+        <p:nvPr/>
+      </p:nvGrpSpPr>
+      <p:grpSpPr>
+        <a:xfrm>
+          <a:off x="0" y="0"/>
+          <a:ext cx="0" cy="0"/>
+          <a:chOff x="0" y="0"/>
+          <a:chExt cx="0" cy="0"/>
+        </a:xfrm>
+      </p:grpSpPr>
+      <p:sp>
+        <p:nvSpPr>
+          <p:cNvPr id="2" name="标题 1"/>
+          <p:cNvSpPr>
+            <a:spLocks noGrp="1"/>
+          </p:cNvSpPr>
+          <p:nvPr>
+            <p:ph type="title"/>
+          </p:nvPr>
+        </p:nvSpPr>
+        <p:spPr/>
+        <p:txBody>
+          <a:bodyPr/>
+          <a:lstStyle/>
+          <a:p>
+            <a:r>
+              <a:rPr lang="en-US" altLang="zh-CN" dirty="0" smtClean="0"/>
+              <a:t>Notes</a:t>
+            </a:r>
+            <a:endParaRPr lang="zh-CN" altLang="en-US" dirty="0"/>
+          </a:p>
+        </p:txBody>
+      </p:sp>
+      <p:sp>
+        <p:nvSpPr>
+          <p:cNvPr id="4" name="日期占位符 3"/>
+          <p:cNvSpPr>
+            <a:spLocks noGrp="1"/>
+          </p:cNvSpPr>
+          <p:nvPr>
+            <p:ph type="dt" sz="half" idx="10"/>
+          </p:nvPr>
+        </p:nvSpPr>
+        <p:spPr/>
+        <p:txBody>
+          <a:bodyPr/>
+          <a:lstStyle/>
+          <a:p>
+            <a:pPr>
+              <a:defRPr/>
+            </a:pPr>
+            <a:r>
+              <a:rPr lang="zh-CN" altLang="en-US" smtClean="0"/>
+              <a:t>祖松鹏</a:t>
+            </a:r>
+            <a:endParaRPr lang="zh-CN" altLang="en-US" dirty="0" smtClean="0"/>
+          </a:p>
+        </p:txBody>
+      </p:sp>
+      <p:sp>
+        <p:nvSpPr>
+          <p:cNvPr id="5" name="页脚占位符 4"/>
+          <p:cNvSpPr>
+            <a:spLocks noGrp="1"/>
+          </p:cNvSpPr>
+          <p:nvPr>
+            <p:ph type="ftr" sz="quarter" idx="11"/>
+          </p:nvPr>
+        </p:nvSpPr>
+        <p:spPr/>
+        <p:txBody>
+          <a:bodyPr/>
+          <a:lstStyle/>
+          <a:p>
+            <a:pPr>
+              <a:defRPr/>
+            </a:pPr>
+            <a:r>
+              <a:rPr lang="zh-CN" altLang="en-US" smtClean="0"/>
+              <a:t>第二次习题课</a:t>
+            </a:r>
+            <a:endParaRPr lang="zh-CN" altLang="en-US" dirty="0"/>
+          </a:p>
+        </p:txBody>
+      </p:sp>
+      <p:sp>
+        <p:nvSpPr>
+          <p:cNvPr id="6" name="灯片编号占位符 5"/>
+          <p:cNvSpPr>
+            <a:spLocks noGrp="1"/>
+          </p:cNvSpPr>
+          <p:nvPr>
+            <p:ph type="sldNum" sz="quarter" idx="12"/>
+          </p:nvPr>
+        </p:nvSpPr>
+        <p:spPr/>
+        <p:txBody>
+          <a:bodyPr/>
+          <a:lstStyle/>
+          <a:p>
+            <a:pPr>
+              <a:defRPr/>
+            </a:pPr>
+            <a:fld id="{8636A3DD-18C9-47FF-B97C-D83E934F991A}" type="slidenum">
+              <a:rPr lang="zh-CN" altLang="en-US" smtClean="0"/>
+              <a:pPr>
+                <a:defRPr/>
+              </a:pPr>
+              <a:t>36</a:t>
+            </a:fld>
+            <a:endParaRPr lang="zh-CN" altLang="en-US" dirty="0"/>
+          </a:p>
+        </p:txBody>
+      </p:sp>
+      <p:pic>
+        <p:nvPicPr>
+          <p:cNvPr id="7" name="图片 6"/>
+          <p:cNvPicPr>
+            <a:picLocks noChangeAspect="1"/>
+          </p:cNvPicPr>
+          <p:nvPr/>
+        </p:nvPicPr>
+        <p:blipFill>
+          <a:blip r:embed="rId2"/>
+          <a:stretch>
+            <a:fillRect/>
+          </a:stretch>
+        </p:blipFill>
+        <p:spPr>
+          <a:xfrm>
+            <a:off x="815686" y="3889402"/>
+            <a:ext cx="7263245" cy="1642877"/>
+          </a:xfrm>
+          <a:prstGeom prst="rect">
+            <a:avLst/>
+          </a:prstGeom>
+        </p:spPr>
+      </p:pic>
+      <p:pic>
+        <p:nvPicPr>
+          <p:cNvPr id="8" name="图片 7"/>
+          <p:cNvPicPr>
+            <a:picLocks noChangeAspect="1"/>
+          </p:cNvPicPr>
+          <p:nvPr/>
+        </p:nvPicPr>
+        <p:blipFill>
+          <a:blip r:embed="rId3"/>
+          <a:stretch>
+            <a:fillRect/>
+          </a:stretch>
+        </p:blipFill>
+        <p:spPr>
+          <a:xfrm>
+            <a:off x="751610" y="1323239"/>
+            <a:ext cx="6885710" cy="1970288"/>
+          </a:xfrm>
+          <a:prstGeom prst="rect">
+            <a:avLst/>
+          </a:prstGeom>
+        </p:spPr>
+      </p:pic>
+    </p:spTree>
+    <p:extLst>
+      <p:ext uri="{BB962C8B-B14F-4D97-AF65-F5344CB8AC3E}">
+        <p14:creationId xmlns:p14="http://schemas.microsoft.com/office/powerpoint/2010/main" val="1992981778"/>
+      </p:ext>
+    </p:extLst>
+  </p:cSld>
+  <p:clrMapOvr>
+    <a:masterClrMapping/>
+  </p:clrMapOvr>
+  <p:timing>
+    <p:tnLst>
+      <p:par>
+        <p:cTn id="1" dur="indefinite" restart="never" nodeType="tmRoot"/>
+      </p:par>
+    </p:tnLst>
+  </p:timing>
 </p:sld>
 </file>
 
@@ -33031,18 +33777,18 @@
                   <a:srgbClr val="FF0000"/>
                 </a:solidFill>
               </a:rPr>
-              <a:t>每遍阅读，目标少而明确</a:t>
-            </a:r>
-            <a:endParaRPr lang="en-US" altLang="zh-CN" b="1" dirty="0" smtClean="0">
-              <a:solidFill>
-                <a:srgbClr val="FF0000"/>
-              </a:solidFill>
-            </a:endParaRPr>
-          </a:p>
-          <a:p>
-            <a:pPr lvl="1"/>
-            <a:r>
-              <a:rPr lang="zh-CN" altLang="en-US" dirty="0" smtClean="0">
+              <a:t>每遍阅读，目标少而</a:t>
+            </a:r>
+            <a:r>
+              <a:rPr lang="zh-CN" altLang="en-US" b="1" dirty="0" smtClean="0">
+                <a:solidFill>
+                  <a:srgbClr val="FF0000"/>
+                </a:solidFill>
+              </a:rPr>
+              <a:t>明确</a:t>
+            </a:r>
+            <a:r>
+              <a:rPr lang="en-US" altLang="zh-CN" b="1" dirty="0">
                 <a:solidFill>
                   <a:srgbClr val="FF0000"/>
                 </a:solidFill>
@@ -33051,7 +33797,11 @@
             </a:r>
             <a:r>
               <a:rPr lang="en-US" altLang="zh-CN" dirty="0" smtClean="0"/>
-              <a:t>(UNIX: KISS)</a:t>
+              <a:t>(</a:t>
+            </a:r>
+            <a:r>
+              <a:rPr lang="en-US" altLang="zh-CN" dirty="0" smtClean="0"/>
+              <a:t>UNIX: KISS)</a:t>
             </a:r>
           </a:p>
           <a:p>
@@ -33064,32 +33814,124 @@
               </a:rPr>
               <a:t>先主线后细节，逐遍深入 </a:t>
             </a:r>
-            <a:endParaRPr lang="en-US" altLang="zh-CN" b="1" dirty="0" smtClean="0">
-              <a:solidFill>
-                <a:srgbClr val="FF0000"/>
-              </a:solidFill>
-            </a:endParaRPr>
-          </a:p>
-          <a:p>
-            <a:pPr marL="342900" lvl="1" indent="0">
-              <a:buNone/>
-            </a:pPr>
+            <a:r>
+              <a:rPr lang="en-US" altLang="zh-CN" b="1" dirty="0">
+                <a:solidFill>
+                  <a:srgbClr val="FF0000"/>
+                </a:solidFill>
+              </a:rPr>
+              <a:t> </a:t>
+            </a:r>
             <a:r>
               <a:rPr lang="en-US" altLang="zh-CN" dirty="0" smtClean="0"/>
               <a:t>(</a:t>
             </a:r>
             <a:r>
               <a:rPr lang="zh-CN" altLang="en-US" dirty="0"/>
-              <a:t>“文与可画竹，胸有成竹。郑板桥画竹，胸无成</a:t>
+              <a:t>“文与可画竹，</a:t>
             </a:r>
             <a:r>
               <a:rPr lang="zh-CN" altLang="en-US" dirty="0" smtClean="0"/>
-              <a:t>竹。”</a:t>
+              <a:t>胸有成竹</a:t>
+            </a:r>
+            <a:r>
+              <a:rPr lang="zh-CN" altLang="en-US" dirty="0"/>
+              <a:t>。</a:t>
+            </a:r>
+            <a:r>
+              <a:rPr lang="en-US" altLang="zh-CN" dirty="0" smtClean="0"/>
+              <a:t>”</a:t>
             </a:r>
             <a:r>
               <a:rPr lang="en-US" altLang="zh-CN" dirty="0" smtClean="0"/>
               <a:t>)</a:t>
             </a:r>
+          </a:p>
+          <a:p>
+            <a:pPr lvl="1"/>
+            <a:endParaRPr lang="en-US" altLang="zh-CN" dirty="0" smtClean="0"/>
+          </a:p>
+          <a:p>
+            <a:r>
+              <a:rPr lang="zh-CN" altLang="en-US" dirty="0" smtClean="0"/>
+              <a:t> 阅读</a:t>
+            </a:r>
+            <a:r>
+              <a:rPr lang="zh-CN" altLang="en-US" dirty="0"/>
+              <a:t>者</a:t>
+            </a:r>
+            <a:r>
+              <a:rPr lang="zh-CN" altLang="en-US" dirty="0" smtClean="0"/>
+              <a:t>的</a:t>
+            </a:r>
+            <a:r>
+              <a:rPr lang="zh-CN" altLang="en-US" dirty="0"/>
+              <a:t>四</a:t>
+            </a:r>
+            <a:r>
+              <a:rPr lang="zh-CN" altLang="en-US" dirty="0" smtClean="0"/>
+              <a:t>种</a:t>
+            </a:r>
+            <a:r>
+              <a:rPr lang="zh-CN" altLang="en-US" dirty="0"/>
+              <a:t>身份</a:t>
+            </a:r>
+            <a:endParaRPr lang="en-US" altLang="zh-CN" dirty="0"/>
+          </a:p>
+          <a:p>
+            <a:pPr lvl="1"/>
+            <a:r>
+              <a:rPr lang="zh-CN" altLang="en-US" b="1" dirty="0"/>
+              <a:t>普通人</a:t>
+            </a:r>
+            <a:r>
+              <a:rPr lang="zh-CN" altLang="en-US" dirty="0"/>
+              <a:t>：文章语言的通俗易懂性</a:t>
+            </a:r>
+            <a:endParaRPr lang="en-US" altLang="zh-CN" dirty="0"/>
+          </a:p>
+          <a:p>
+            <a:pPr lvl="1"/>
+            <a:r>
+              <a:rPr lang="zh-CN" altLang="en-US" b="1" dirty="0"/>
+              <a:t>审稿人</a:t>
+            </a:r>
+            <a:r>
+              <a:rPr lang="zh-CN" altLang="en-US" dirty="0"/>
+              <a:t>：抓住文章的主要贡献，明晰主线，去伪存真</a:t>
+            </a:r>
+            <a:endParaRPr lang="en-US" altLang="zh-CN" dirty="0"/>
+          </a:p>
+          <a:p>
+            <a:pPr lvl="1"/>
+            <a:r>
+              <a:rPr lang="zh-CN" altLang="en-US" b="1" dirty="0"/>
+              <a:t>作者自身</a:t>
+            </a:r>
+            <a:r>
+              <a:rPr lang="zh-CN" altLang="en-US" dirty="0"/>
+              <a:t>：设身处地，思路对比，问题</a:t>
+            </a:r>
+            <a:r>
+              <a:rPr lang="zh-CN" altLang="en-US" dirty="0" smtClean="0"/>
+              <a:t>扩展</a:t>
+            </a:r>
+            <a:endParaRPr lang="en-US" altLang="zh-CN" dirty="0" smtClean="0"/>
+          </a:p>
+          <a:p>
+            <a:pPr lvl="1"/>
+            <a:r>
+              <a:rPr lang="zh-CN" altLang="en-US" b="1" dirty="0" smtClean="0"/>
+              <a:t>学习者</a:t>
+            </a:r>
+            <a:r>
+              <a:rPr lang="zh-CN" altLang="en-US" dirty="0" smtClean="0"/>
+              <a:t>：模仿，抠细节</a:t>
+            </a:r>
+            <a:endParaRPr lang="zh-CN" altLang="en-US" dirty="0"/>
+          </a:p>
+          <a:p>
+            <a:endParaRPr lang="en-US" altLang="zh-CN" dirty="0" smtClean="0"/>
           </a:p>
         </p:txBody>
       </p:sp>
@@ -33174,54 +34016,6 @@
           </a:p>
         </p:txBody>
       </p:sp>
-      <p:pic>
-        <p:nvPicPr>
-          <p:cNvPr id="7" name="图片 6"/>
-          <p:cNvPicPr>
-            <a:picLocks noChangeAspect="1"/>
-          </p:cNvPicPr>
-          <p:nvPr/>
-        </p:nvPicPr>
-        <p:blipFill>
-          <a:blip r:embed="rId2"/>
-          <a:stretch>
-            <a:fillRect/>
-          </a:stretch>
-        </p:blipFill>
-        <p:spPr>
-          <a:xfrm>
-            <a:off x="628650" y="4671621"/>
-            <a:ext cx="7263245" cy="1642877"/>
-          </a:xfrm>
-          <a:prstGeom prst="rect">
-            <a:avLst/>
-          </a:prstGeom>
-        </p:spPr>
-      </p:pic>
-      <p:pic>
-        <p:nvPicPr>
-          <p:cNvPr id="8" name="图片 7"/>
-          <p:cNvPicPr>
-            <a:picLocks noChangeAspect="1"/>
-          </p:cNvPicPr>
-          <p:nvPr/>
-        </p:nvPicPr>
-        <p:blipFill>
-          <a:blip r:embed="rId3"/>
-          <a:stretch>
-            <a:fillRect/>
-          </a:stretch>
-        </p:blipFill>
-        <p:spPr>
-          <a:xfrm>
-            <a:off x="786247" y="2632605"/>
-            <a:ext cx="6885710" cy="1970288"/>
-          </a:xfrm>
-          <a:prstGeom prst="rect">
-            <a:avLst/>
-          </a:prstGeom>
-        </p:spPr>
-      </p:pic>
     </p:spTree>
     <p:extLst>
       <p:ext uri="{BB962C8B-B14F-4D97-AF65-F5344CB8AC3E}">
@@ -33235,9 +34029,427 @@
   <p:timing>
     <p:tnLst>
       <p:par>
-        <p:cTn id="1" dur="indefinite" restart="never" nodeType="tmRoot"/>
+        <p:cTn id="1" dur="indefinite" restart="never" nodeType="tmRoot">
+          <p:childTnLst>
+            <p:seq concurrent="1" nextAc="seek">
+              <p:cTn id="2" dur="indefinite" nodeType="mainSeq">
+                <p:childTnLst>
+                  <p:par>
+                    <p:cTn id="3" fill="hold">
+                      <p:stCondLst>
+                        <p:cond delay="indefinite"/>
+                      </p:stCondLst>
+                      <p:childTnLst>
+                        <p:par>
+                          <p:cTn id="4" fill="hold">
+                            <p:stCondLst>
+                              <p:cond delay="0"/>
+                            </p:stCondLst>
+                            <p:childTnLst>
+                              <p:par>
+                                <p:cTn id="5" presetID="1" presetClass="entr" presetSubtype="0" fill="hold" grpId="0" nodeType="clickEffect">
+                                  <p:stCondLst>
+                                    <p:cond delay="0"/>
+                                  </p:stCondLst>
+                                  <p:childTnLst>
+                                    <p:set>
+                                      <p:cBhvr>
+                                        <p:cTn id="6" dur="1" fill="hold">
+                                          <p:stCondLst>
+                                            <p:cond delay="0"/>
+                                          </p:stCondLst>
+                                        </p:cTn>
+                                        <p:tgtEl>
+                                          <p:spTgt spid="3">
+                                            <p:txEl>
+                                              <p:pRg st="0" end="0"/>
+                                            </p:txEl>
+                                          </p:spTgt>
+                                        </p:tgtEl>
+                                        <p:attrNameLst>
+                                          <p:attrName>style.visibility</p:attrName>
+                                        </p:attrNameLst>
+                                      </p:cBhvr>
+                                      <p:to>
+                                        <p:strVal val="visible"/>
+                                      </p:to>
+                                    </p:set>
+                                  </p:childTnLst>
+                                </p:cTn>
+                              </p:par>
+                            </p:childTnLst>
+                          </p:cTn>
+                        </p:par>
+                      </p:childTnLst>
+                    </p:cTn>
+                  </p:par>
+                  <p:par>
+                    <p:cTn id="7" fill="hold">
+                      <p:stCondLst>
+                        <p:cond delay="indefinite"/>
+                      </p:stCondLst>
+                      <p:childTnLst>
+                        <p:par>
+                          <p:cTn id="8" fill="hold">
+                            <p:stCondLst>
+                              <p:cond delay="0"/>
+                            </p:stCondLst>
+                            <p:childTnLst>
+                              <p:par>
+                                <p:cTn id="9" presetID="1" presetClass="entr" presetSubtype="0" fill="hold" grpId="0" nodeType="clickEffect">
+                                  <p:stCondLst>
+                                    <p:cond delay="0"/>
+                                  </p:stCondLst>
+                                  <p:childTnLst>
+                                    <p:set>
+                                      <p:cBhvr>
+                                        <p:cTn id="10" dur="1" fill="hold">
+                                          <p:stCondLst>
+                                            <p:cond delay="0"/>
+                                          </p:stCondLst>
+                                        </p:cTn>
+                                        <p:tgtEl>
+                                          <p:spTgt spid="3">
+                                            <p:txEl>
+                                              <p:pRg st="1" end="1"/>
+                                            </p:txEl>
+                                          </p:spTgt>
+                                        </p:tgtEl>
+                                        <p:attrNameLst>
+                                          <p:attrName>style.visibility</p:attrName>
+                                        </p:attrNameLst>
+                                      </p:cBhvr>
+                                      <p:to>
+                                        <p:strVal val="visible"/>
+                                      </p:to>
+                                    </p:set>
+                                  </p:childTnLst>
+                                </p:cTn>
+                              </p:par>
+                            </p:childTnLst>
+                          </p:cTn>
+                        </p:par>
+                      </p:childTnLst>
+                    </p:cTn>
+                  </p:par>
+                  <p:par>
+                    <p:cTn id="11" fill="hold">
+                      <p:stCondLst>
+                        <p:cond delay="indefinite"/>
+                      </p:stCondLst>
+                      <p:childTnLst>
+                        <p:par>
+                          <p:cTn id="12" fill="hold">
+                            <p:stCondLst>
+                              <p:cond delay="0"/>
+                            </p:stCondLst>
+                            <p:childTnLst>
+                              <p:par>
+                                <p:cTn id="13" presetID="1" presetClass="entr" presetSubtype="0" fill="hold" grpId="0" nodeType="clickEffect">
+                                  <p:stCondLst>
+                                    <p:cond delay="0"/>
+                                  </p:stCondLst>
+                                  <p:childTnLst>
+                                    <p:set>
+                                      <p:cBhvr>
+                                        <p:cTn id="14" dur="1" fill="hold">
+                                          <p:stCondLst>
+                                            <p:cond delay="0"/>
+                                          </p:stCondLst>
+                                        </p:cTn>
+                                        <p:tgtEl>
+                                          <p:spTgt spid="3">
+                                            <p:txEl>
+                                              <p:pRg st="2" end="2"/>
+                                            </p:txEl>
+                                          </p:spTgt>
+                                        </p:tgtEl>
+                                        <p:attrNameLst>
+                                          <p:attrName>style.visibility</p:attrName>
+                                        </p:attrNameLst>
+                                      </p:cBhvr>
+                                      <p:to>
+                                        <p:strVal val="visible"/>
+                                      </p:to>
+                                    </p:set>
+                                  </p:childTnLst>
+                                </p:cTn>
+                              </p:par>
+                            </p:childTnLst>
+                          </p:cTn>
+                        </p:par>
+                      </p:childTnLst>
+                    </p:cTn>
+                  </p:par>
+                  <p:par>
+                    <p:cTn id="15" fill="hold">
+                      <p:stCondLst>
+                        <p:cond delay="indefinite"/>
+                      </p:stCondLst>
+                      <p:childTnLst>
+                        <p:par>
+                          <p:cTn id="16" fill="hold">
+                            <p:stCondLst>
+                              <p:cond delay="0"/>
+                            </p:stCondLst>
+                            <p:childTnLst>
+                              <p:par>
+                                <p:cTn id="17" presetID="1" presetClass="entr" presetSubtype="0" fill="hold" grpId="0" nodeType="clickEffect">
+                                  <p:stCondLst>
+                                    <p:cond delay="0"/>
+                                  </p:stCondLst>
+                                  <p:childTnLst>
+                                    <p:set>
+                                      <p:cBhvr>
+                                        <p:cTn id="18" dur="1" fill="hold">
+                                          <p:stCondLst>
+                                            <p:cond delay="0"/>
+                                          </p:stCondLst>
+                                        </p:cTn>
+                                        <p:tgtEl>
+                                          <p:spTgt spid="3">
+                                            <p:txEl>
+                                              <p:pRg st="4" end="4"/>
+                                            </p:txEl>
+                                          </p:spTgt>
+                                        </p:tgtEl>
+                                        <p:attrNameLst>
+                                          <p:attrName>style.visibility</p:attrName>
+                                        </p:attrNameLst>
+                                      </p:cBhvr>
+                                      <p:to>
+                                        <p:strVal val="visible"/>
+                                      </p:to>
+                                    </p:set>
+                                  </p:childTnLst>
+                                </p:cTn>
+                              </p:par>
+                            </p:childTnLst>
+                          </p:cTn>
+                        </p:par>
+                      </p:childTnLst>
+                    </p:cTn>
+                  </p:par>
+                  <p:par>
+                    <p:cTn id="19" fill="hold">
+                      <p:stCondLst>
+                        <p:cond delay="indefinite"/>
+                      </p:stCondLst>
+                      <p:childTnLst>
+                        <p:par>
+                          <p:cTn id="20" fill="hold">
+                            <p:stCondLst>
+                              <p:cond delay="0"/>
+                            </p:stCondLst>
+                            <p:childTnLst>
+                              <p:par>
+                                <p:cTn id="21" presetID="1" presetClass="entr" presetSubtype="0" fill="hold" grpId="0" nodeType="clickEffect">
+                                  <p:stCondLst>
+                                    <p:cond delay="0"/>
+                                  </p:stCondLst>
+                                  <p:childTnLst>
+                                    <p:set>
+                                      <p:cBhvr>
+                                        <p:cTn id="22" dur="1" fill="hold">
+                                          <p:stCondLst>
+                                            <p:cond delay="0"/>
+                                          </p:stCondLst>
+                                        </p:cTn>
+                                        <p:tgtEl>
+                                          <p:spTgt spid="3">
+                                            <p:txEl>
+                                              <p:pRg st="5" end="5"/>
+                                            </p:txEl>
+                                          </p:spTgt>
+                                        </p:tgtEl>
+                                        <p:attrNameLst>
+                                          <p:attrName>style.visibility</p:attrName>
+                                        </p:attrNameLst>
+                                      </p:cBhvr>
+                                      <p:to>
+                                        <p:strVal val="visible"/>
+                                      </p:to>
+                                    </p:set>
+                                  </p:childTnLst>
+                                </p:cTn>
+                              </p:par>
+                            </p:childTnLst>
+                          </p:cTn>
+                        </p:par>
+                      </p:childTnLst>
+                    </p:cTn>
+                  </p:par>
+                  <p:par>
+                    <p:cTn id="23" fill="hold">
+                      <p:stCondLst>
+                        <p:cond delay="indefinite"/>
+                      </p:stCondLst>
+                      <p:childTnLst>
+                        <p:par>
+                          <p:cTn id="24" fill="hold">
+                            <p:stCondLst>
+                              <p:cond delay="0"/>
+                            </p:stCondLst>
+                            <p:childTnLst>
+                              <p:par>
+                                <p:cTn id="25" presetID="1" presetClass="entr" presetSubtype="0" fill="hold" grpId="0" nodeType="clickEffect">
+                                  <p:stCondLst>
+                                    <p:cond delay="0"/>
+                                  </p:stCondLst>
+                                  <p:childTnLst>
+                                    <p:set>
+                                      <p:cBhvr>
+                                        <p:cTn id="26" dur="1" fill="hold">
+                                          <p:stCondLst>
+                                            <p:cond delay="0"/>
+                                          </p:stCondLst>
+                                        </p:cTn>
+                                        <p:tgtEl>
+                                          <p:spTgt spid="3">
+                                            <p:txEl>
+                                              <p:pRg st="6" end="6"/>
+                                            </p:txEl>
+                                          </p:spTgt>
+                                        </p:tgtEl>
+                                        <p:attrNameLst>
+                                          <p:attrName>style.visibility</p:attrName>
+                                        </p:attrNameLst>
+                                      </p:cBhvr>
+                                      <p:to>
+                                        <p:strVal val="visible"/>
+                                      </p:to>
+                                    </p:set>
+                                  </p:childTnLst>
+                                </p:cTn>
+                              </p:par>
+                            </p:childTnLst>
+                          </p:cTn>
+                        </p:par>
+                      </p:childTnLst>
+                    </p:cTn>
+                  </p:par>
+                  <p:par>
+                    <p:cTn id="27" fill="hold">
+                      <p:stCondLst>
+                        <p:cond delay="indefinite"/>
+                      </p:stCondLst>
+                      <p:childTnLst>
+                        <p:par>
+                          <p:cTn id="28" fill="hold">
+                            <p:stCondLst>
+                              <p:cond delay="0"/>
+                            </p:stCondLst>
+                            <p:childTnLst>
+                              <p:par>
+                                <p:cTn id="29" presetID="1" presetClass="entr" presetSubtype="0" fill="hold" grpId="0" nodeType="clickEffect">
+                                  <p:stCondLst>
+                                    <p:cond delay="0"/>
+                                  </p:stCondLst>
+                                  <p:childTnLst>
+                                    <p:set>
+                                      <p:cBhvr>
+                                        <p:cTn id="30" dur="1" fill="hold">
+                                          <p:stCondLst>
+                                            <p:cond delay="0"/>
+                                          </p:stCondLst>
+                                        </p:cTn>
+                                        <p:tgtEl>
+                                          <p:spTgt spid="3">
+                                            <p:txEl>
+                                              <p:pRg st="7" end="7"/>
+                                            </p:txEl>
+                                          </p:spTgt>
+                                        </p:tgtEl>
+                                        <p:attrNameLst>
+                                          <p:attrName>style.visibility</p:attrName>
+                                        </p:attrNameLst>
+                                      </p:cBhvr>
+                                      <p:to>
+                                        <p:strVal val="visible"/>
+                                      </p:to>
+                                    </p:set>
+                                  </p:childTnLst>
+                                </p:cTn>
+                              </p:par>
+                            </p:childTnLst>
+                          </p:cTn>
+                        </p:par>
+                      </p:childTnLst>
+                    </p:cTn>
+                  </p:par>
+                  <p:par>
+                    <p:cTn id="31" fill="hold">
+                      <p:stCondLst>
+                        <p:cond delay="indefinite"/>
+                      </p:stCondLst>
+                      <p:childTnLst>
+                        <p:par>
+                          <p:cTn id="32" fill="hold">
+                            <p:stCondLst>
+                              <p:cond delay="0"/>
+                            </p:stCondLst>
+                            <p:childTnLst>
+                              <p:par>
+                                <p:cTn id="33" presetID="1" presetClass="entr" presetSubtype="0" fill="hold" grpId="0" nodeType="clickEffect">
+                                  <p:stCondLst>
+                                    <p:cond delay="0"/>
+                                  </p:stCondLst>
+                                  <p:childTnLst>
+                                    <p:set>
+                                      <p:cBhvr>
+                                        <p:cTn id="34" dur="1" fill="hold">
+                                          <p:stCondLst>
+                                            <p:cond delay="0"/>
+                                          </p:stCondLst>
+                                        </p:cTn>
+                                        <p:tgtEl>
+                                          <p:spTgt spid="3">
+                                            <p:txEl>
+                                              <p:pRg st="8" end="8"/>
+                                            </p:txEl>
+                                          </p:spTgt>
+                                        </p:tgtEl>
+                                        <p:attrNameLst>
+                                          <p:attrName>style.visibility</p:attrName>
+                                        </p:attrNameLst>
+                                      </p:cBhvr>
+                                      <p:to>
+                                        <p:strVal val="visible"/>
+                                      </p:to>
+                                    </p:set>
+                                  </p:childTnLst>
+                                </p:cTn>
+                              </p:par>
+                            </p:childTnLst>
+                          </p:cTn>
+                        </p:par>
+                      </p:childTnLst>
+                    </p:cTn>
+                  </p:par>
+                </p:childTnLst>
+              </p:cTn>
+              <p:prevCondLst>
+                <p:cond evt="onPrev" delay="0">
+                  <p:tgtEl>
+                    <p:sldTgt/>
+                  </p:tgtEl>
+                </p:cond>
+              </p:prevCondLst>
+              <p:nextCondLst>
+                <p:cond evt="onNext" delay="0">
+                  <p:tgtEl>
+                    <p:sldTgt/>
+                  </p:tgtEl>
+                </p:cond>
+              </p:nextCondLst>
+            </p:seq>
+          </p:childTnLst>
+        </p:cTn>
       </p:par>
     </p:tnLst>
+    <p:bldLst>
+      <p:bldP spid="3" grpId="0" uiExpand="1" build="p"/>
+    </p:bldLst>
   </p:timing>
 </p:sld>
 </file>
@@ -33284,73 +34496,6 @@
       </p:sp>
       <p:sp>
         <p:nvSpPr>
-          <p:cNvPr id="3" name="内容占位符 2"/>
-          <p:cNvSpPr>
-            <a:spLocks noGrp="1"/>
-          </p:cNvSpPr>
-          <p:nvPr>
-            <p:ph idx="1"/>
-          </p:nvPr>
-        </p:nvSpPr>
-        <p:spPr/>
-        <p:txBody>
-          <a:bodyPr/>
-          <a:lstStyle/>
-          <a:p>
-            <a:r>
-              <a:rPr lang="en-US" altLang="zh-CN" dirty="0" smtClean="0"/>
-              <a:t> </a:t>
-            </a:r>
-            <a:r>
-              <a:rPr lang="zh-CN" altLang="en-US" dirty="0" smtClean="0"/>
-              <a:t>阅读者的三种身份</a:t>
-            </a:r>
-            <a:endParaRPr lang="en-US" altLang="zh-CN" dirty="0" smtClean="0"/>
-          </a:p>
-          <a:p>
-            <a:pPr lvl="1"/>
-            <a:r>
-              <a:rPr lang="zh-CN" altLang="en-US" b="1" dirty="0" smtClean="0"/>
-              <a:t>普通人</a:t>
-            </a:r>
-            <a:r>
-              <a:rPr lang="zh-CN" altLang="en-US" dirty="0" smtClean="0"/>
-              <a:t>：文章语言的通俗易懂性</a:t>
-            </a:r>
-            <a:endParaRPr lang="en-US" altLang="zh-CN" dirty="0" smtClean="0"/>
-          </a:p>
-          <a:p>
-            <a:pPr lvl="1"/>
-            <a:r>
-              <a:rPr lang="zh-CN" altLang="en-US" b="1" dirty="0"/>
-              <a:t>审稿</a:t>
-            </a:r>
-            <a:r>
-              <a:rPr lang="zh-CN" altLang="en-US" b="1" dirty="0" smtClean="0"/>
-              <a:t>人</a:t>
-            </a:r>
-            <a:r>
-              <a:rPr lang="zh-CN" altLang="en-US" dirty="0" smtClean="0"/>
-              <a:t>：抓住文章的主要贡献，明晰主线，去伪存真</a:t>
-            </a:r>
-            <a:endParaRPr lang="en-US" altLang="zh-CN" dirty="0" smtClean="0"/>
-          </a:p>
-          <a:p>
-            <a:pPr lvl="1"/>
-            <a:r>
-              <a:rPr lang="zh-CN" altLang="en-US" b="1" dirty="0" smtClean="0"/>
-              <a:t>作者自身</a:t>
-            </a:r>
-            <a:r>
-              <a:rPr lang="zh-CN" altLang="en-US" dirty="0" smtClean="0"/>
-              <a:t>：设身处地，思路对比，问题扩展</a:t>
-            </a:r>
-            <a:endParaRPr lang="zh-CN" altLang="en-US" dirty="0"/>
-          </a:p>
-        </p:txBody>
-      </p:sp>
-      <p:sp>
-        <p:nvSpPr>
           <p:cNvPr id="4" name="日期占位符 3"/>
           <p:cNvSpPr>
             <a:spLocks noGrp="1"/>
@@ -33446,8 +34591,8 @@
         </p:blipFill>
         <p:spPr>
           <a:xfrm>
-            <a:off x="1428095" y="3683862"/>
-            <a:ext cx="5804317" cy="2600056"/>
+            <a:off x="728439" y="2472370"/>
+            <a:ext cx="6993103" cy="3132575"/>
           </a:xfrm>
           <a:prstGeom prst="rect">
             <a:avLst/>
@@ -33470,8 +34615,8 @@
         </p:blipFill>
         <p:spPr>
           <a:xfrm>
-            <a:off x="1428095" y="2309439"/>
-            <a:ext cx="5868397" cy="1286012"/>
+            <a:off x="853131" y="796636"/>
+            <a:ext cx="6635251" cy="1454062"/>
           </a:xfrm>
           <a:prstGeom prst="rect">
             <a:avLst/>
@@ -33912,7 +35057,7 @@
           <a:graphicData uri="http://schemas.openxmlformats.org/presentationml/2006/ole">
             <mc:AlternateContent xmlns:mc="http://schemas.openxmlformats.org/markup-compatibility/2006">
               <mc:Choice xmlns:v="urn:schemas-microsoft-com:vml" Requires="v">
-                <p:oleObj spid="_x0000_s5131" name="Equation" r:id="rId4" imgW="7886700" imgH="495300" progId="Equation.3">
+                <p:oleObj spid="_x0000_s5176" name="Equation" r:id="rId4" imgW="7886700" imgH="495300" progId="Equation.3">
                   <p:embed/>
                 </p:oleObj>
               </mc:Choice>
@@ -33982,7 +35127,7 @@
           <a:graphicData uri="http://schemas.openxmlformats.org/presentationml/2006/ole">
             <mc:AlternateContent xmlns:mc="http://schemas.openxmlformats.org/markup-compatibility/2006">
               <mc:Choice xmlns:v="urn:schemas-microsoft-com:vml" Requires="v">
-                <p:oleObj spid="_x0000_s5132" name="Equation" r:id="rId6" imgW="4622800" imgH="1066800" progId="Equation.3">
+                <p:oleObj spid="_x0000_s5177" name="Equation" r:id="rId6" imgW="4622800" imgH="1066800" progId="Equation.3">
                   <p:embed/>
                 </p:oleObj>
               </mc:Choice>
@@ -34052,7 +35197,7 @@
           <a:graphicData uri="http://schemas.openxmlformats.org/presentationml/2006/ole">
             <mc:AlternateContent xmlns:mc="http://schemas.openxmlformats.org/markup-compatibility/2006">
               <mc:Choice xmlns:v="urn:schemas-microsoft-com:vml" Requires="v">
-                <p:oleObj spid="_x0000_s5133" name="Equation" r:id="rId8" imgW="3835400" imgH="1016000" progId="Equation.3">
+                <p:oleObj spid="_x0000_s5178" name="Equation" r:id="rId8" imgW="3835400" imgH="1016000" progId="Equation.3">
                   <p:embed/>
                 </p:oleObj>
               </mc:Choice>
@@ -34422,7 +35567,7 @@
           <a:graphicData uri="http://schemas.openxmlformats.org/presentationml/2006/ole">
             <mc:AlternateContent xmlns:mc="http://schemas.openxmlformats.org/markup-compatibility/2006">
               <mc:Choice xmlns:v="urn:schemas-microsoft-com:vml" Requires="v">
-                <p:oleObj spid="_x0000_s6152" name="Equation" r:id="rId4" imgW="4724400" imgH="1346200" progId="Equation.3">
+                <p:oleObj spid="_x0000_s6182" name="Equation" r:id="rId4" imgW="4724400" imgH="1346200" progId="Equation.3">
                   <p:embed/>
                 </p:oleObj>
               </mc:Choice>
@@ -34492,7 +35637,7 @@
           <a:graphicData uri="http://schemas.openxmlformats.org/presentationml/2006/ole">
             <mc:AlternateContent xmlns:mc="http://schemas.openxmlformats.org/markup-compatibility/2006">
               <mc:Choice xmlns:v="urn:schemas-microsoft-com:vml" Requires="v">
-                <p:oleObj spid="_x0000_s6153" name="Equation" r:id="rId6" imgW="4597400" imgH="406400" progId="Equation.3">
+                <p:oleObj spid="_x0000_s6183" name="Equation" r:id="rId6" imgW="4597400" imgH="406400" progId="Equation.3">
                   <p:embed/>
                 </p:oleObj>
               </mc:Choice>

</xml_diff>